<commit_message>
Conclusão da aula 2
</commit_message>
<xml_diff>
--- a/material/OP_aula2.pptx
+++ b/material/OP_aula2.pptx
@@ -5,7 +5,7 @@
     <p:sldMasterId id="2147483648" r:id="rId1"/>
   </p:sldMasterIdLst>
   <p:notesMasterIdLst>
-    <p:notesMasterId r:id="rId9"/>
+    <p:notesMasterId r:id="rId10"/>
   </p:notesMasterIdLst>
   <p:sldIdLst>
     <p:sldId id="256" r:id="rId2"/>
@@ -13,8 +13,9 @@
     <p:sldId id="258" r:id="rId4"/>
     <p:sldId id="259" r:id="rId5"/>
     <p:sldId id="260" r:id="rId6"/>
-    <p:sldId id="261" r:id="rId7"/>
+    <p:sldId id="264" r:id="rId7"/>
     <p:sldId id="262" r:id="rId8"/>
+    <p:sldId id="263" r:id="rId9"/>
   </p:sldIdLst>
   <p:sldSz cx="9144000" cy="6858000" type="screen4x3"/>
   <p:notesSz cx="6858000" cy="9144000"/>
@@ -3973,7 +3974,7 @@
           <p:cNvPr id="2" name="Title 1">
             <a:extLst>
               <a:ext uri="{FF2B5EF4-FFF2-40B4-BE49-F238E27FC236}">
-                <a16:creationId xmlns:a16="http://schemas.microsoft.com/office/drawing/2014/main" id="{9A082A3A-3DAB-413C-B0F6-F6561428B6BD}"/>
+                <a16:creationId xmlns:a16="http://schemas.microsoft.com/office/drawing/2014/main" id="{4F0A0A3C-E977-4CC3-8FFA-6F2A78CC8FDE}"/>
               </a:ext>
             </a:extLst>
           </p:cNvPr>
@@ -3984,12 +3985,7 @@
             <p:ph type="title"/>
           </p:nvPr>
         </p:nvSpPr>
-        <p:spPr>
-          <a:xfrm>
-            <a:off x="1187624" y="3071018"/>
-            <a:ext cx="7315200" cy="715963"/>
-          </a:xfrm>
-        </p:spPr>
+        <p:spPr/>
         <p:txBody>
           <a:bodyPr/>
           <a:lstStyle/>
@@ -3998,13 +3994,56 @@
               <a:rPr lang="pt-BR" dirty="0"/>
               <a:t>CONFIGURAÇÃO DOS EMAILS</a:t>
             </a:r>
+          </a:p>
+        </p:txBody>
+      </p:sp>
+      <p:sp>
+        <p:nvSpPr>
+          <p:cNvPr id="3" name="Content Placeholder 2">
+            <a:extLst>
+              <a:ext uri="{FF2B5EF4-FFF2-40B4-BE49-F238E27FC236}">
+                <a16:creationId xmlns:a16="http://schemas.microsoft.com/office/drawing/2014/main" id="{8B39A64B-7096-4AE9-B070-695489435228}"/>
+              </a:ext>
+            </a:extLst>
+          </p:cNvPr>
+          <p:cNvSpPr>
+            <a:spLocks noGrp="1"/>
+          </p:cNvSpPr>
+          <p:nvPr>
+            <p:ph idx="1"/>
+          </p:nvPr>
+        </p:nvSpPr>
+        <p:spPr/>
+        <p:txBody>
+          <a:bodyPr/>
+          <a:lstStyle/>
+          <a:p>
+            <a:r>
+              <a:rPr lang="pt-BR" dirty="0"/>
+              <a:t>Link para o repositório:</a:t>
+            </a:r>
+          </a:p>
+          <a:p>
+            <a:r>
+              <a:rPr lang="pt-BR" dirty="0">
+                <a:hlinkClick r:id="rId2"/>
+              </a:rPr>
+              <a:t>https://github.com/IgorBarreto/aulas_python_projeto</a:t>
+            </a:r>
+            <a:r>
+              <a:rPr lang="pt-BR" dirty="0"/>
+              <a:t> </a:t>
+            </a:r>
+          </a:p>
+          <a:p>
+            <a:endParaRPr lang="pt-BR" dirty="0"/>
           </a:p>
         </p:txBody>
       </p:sp>
     </p:spTree>
     <p:extLst>
       <p:ext uri="{BB962C8B-B14F-4D97-AF65-F5344CB8AC3E}">
-        <p14:creationId xmlns:p14="http://schemas.microsoft.com/office/powerpoint/2010/main" val="790462058"/>
+        <p14:creationId xmlns:p14="http://schemas.microsoft.com/office/powerpoint/2010/main" val="1002744514"/>
       </p:ext>
     </p:extLst>
   </p:cSld>
@@ -4080,6 +4119,37 @@
           <a:bodyPr/>
           <a:lstStyle/>
           <a:p>
+            <a:r>
+              <a:rPr lang="pt-BR" dirty="0"/>
+              <a:t>Python – Linguagem escolhida </a:t>
+            </a:r>
+            <a:r>
+              <a:rPr lang="pt-BR" dirty="0">
+                <a:hlinkClick r:id="rId2"/>
+              </a:rPr>
+              <a:t>https://www.python.org/downloads/</a:t>
+            </a:r>
+            <a:r>
+              <a:rPr lang="pt-BR" dirty="0"/>
+              <a:t> </a:t>
+            </a:r>
+          </a:p>
+          <a:p>
+            <a:r>
+              <a:rPr lang="pt-BR" dirty="0"/>
+              <a:t>Pycharm – IDE escolhida (Integrated development enviroment) </a:t>
+            </a:r>
+          </a:p>
+          <a:p>
+            <a:r>
+              <a:rPr lang="pt-BR" dirty="0">
+                <a:hlinkClick r:id="rId3"/>
+              </a:rPr>
+              <a:t>https://www.jetbrains.com/pycharm/</a:t>
+            </a:r>
+            <a:endParaRPr lang="pt-BR" dirty="0"/>
+          </a:p>
+          <a:p>
             <a:endParaRPr lang="pt-BR" dirty="0"/>
           </a:p>
         </p:txBody>
@@ -4088,6 +4158,445 @@
     <p:extLst>
       <p:ext uri="{BB962C8B-B14F-4D97-AF65-F5344CB8AC3E}">
         <p14:creationId xmlns:p14="http://schemas.microsoft.com/office/powerpoint/2010/main" val="4201354076"/>
+      </p:ext>
+    </p:extLst>
+  </p:cSld>
+  <p:clrMapOvr>
+    <a:masterClrMapping/>
+  </p:clrMapOvr>
+</p:sld>
+</file>
+
+<file path=ppt/slides/slide8.xml><?xml version="1.0" encoding="utf-8"?>
+<p:sld xmlns:a="http://schemas.openxmlformats.org/drawingml/2006/main" xmlns:r="http://schemas.openxmlformats.org/officeDocument/2006/relationships" xmlns:p="http://schemas.openxmlformats.org/presentationml/2006/main">
+  <p:cSld>
+    <p:spTree>
+      <p:nvGrpSpPr>
+        <p:cNvPr id="1" name=""/>
+        <p:cNvGrpSpPr/>
+        <p:nvPr/>
+      </p:nvGrpSpPr>
+      <p:grpSpPr>
+        <a:xfrm>
+          <a:off x="0" y="0"/>
+          <a:ext cx="0" cy="0"/>
+          <a:chOff x="0" y="0"/>
+          <a:chExt cx="0" cy="0"/>
+        </a:xfrm>
+      </p:grpSpPr>
+      <p:sp>
+        <p:nvSpPr>
+          <p:cNvPr id="7" name="Title 1">
+            <a:extLst>
+              <a:ext uri="{FF2B5EF4-FFF2-40B4-BE49-F238E27FC236}">
+                <a16:creationId xmlns:a16="http://schemas.microsoft.com/office/drawing/2014/main" id="{9F527DC3-A178-4092-A85B-DD0A9984B31D}"/>
+              </a:ext>
+            </a:extLst>
+          </p:cNvPr>
+          <p:cNvSpPr txBox="1">
+            <a:spLocks/>
+          </p:cNvSpPr>
+          <p:nvPr/>
+        </p:nvSpPr>
+        <p:spPr bwMode="auto">
+          <a:xfrm>
+            <a:off x="1187624" y="3212976"/>
+            <a:ext cx="7315200" cy="715963"/>
+          </a:xfrm>
+          <a:prstGeom prst="rect">
+            <a:avLst/>
+          </a:prstGeom>
+          <a:noFill/>
+          <a:ln>
+            <a:noFill/>
+          </a:ln>
+          <a:effectLst/>
+          <a:extLst>
+            <a:ext uri="{909E8E84-426E-40DD-AFC4-6F175D3DCCD1}">
+              <a14:hiddenFill xmlns:a14="http://schemas.microsoft.com/office/drawing/2010/main">
+                <a:solidFill>
+                  <a:schemeClr val="accent1"/>
+                </a:solidFill>
+              </a14:hiddenFill>
+            </a:ext>
+            <a:ext uri="{91240B29-F687-4F45-9708-019B960494DF}">
+              <a14:hiddenLine xmlns:a14="http://schemas.microsoft.com/office/drawing/2010/main" w="9525">
+                <a:solidFill>
+                  <a:schemeClr val="tx1"/>
+                </a:solidFill>
+                <a:miter lim="800000"/>
+                <a:headEnd/>
+                <a:tailEnd/>
+              </a14:hiddenLine>
+            </a:ext>
+            <a:ext uri="{AF507438-7753-43E0-B8FC-AC1667EBCBE1}">
+              <a14:hiddenEffects xmlns:a14="http://schemas.microsoft.com/office/drawing/2010/main">
+                <a:effectLst>
+                  <a:outerShdw dist="35921" dir="2700000" algn="ctr" rotWithShape="0">
+                    <a:schemeClr val="bg2"/>
+                  </a:outerShdw>
+                </a:effectLst>
+              </a14:hiddenEffects>
+            </a:ext>
+          </a:extLst>
+        </p:spPr>
+        <p:txBody>
+          <a:bodyPr vert="horz" wrap="square" lIns="91440" tIns="45720" rIns="91440" bIns="45720" numCol="1" anchor="ctr" anchorCtr="0" compatLnSpc="1">
+            <a:prstTxWarp prst="textNoShape">
+              <a:avLst/>
+            </a:prstTxWarp>
+          </a:bodyPr>
+          <a:lstStyle>
+            <a:lvl1pPr algn="l" rtl="0" eaLnBrk="1" fontAlgn="base" hangingPunct="1">
+              <a:spcBef>
+                <a:spcPct val="0"/>
+              </a:spcBef>
+              <a:spcAft>
+                <a:spcPct val="0"/>
+              </a:spcAft>
+              <a:defRPr sz="4400" kern="1200">
+                <a:solidFill>
+                  <a:schemeClr val="bg1"/>
+                </a:solidFill>
+                <a:latin typeface="+mj-lt"/>
+                <a:ea typeface="+mj-ea"/>
+                <a:cs typeface="+mj-cs"/>
+              </a:defRPr>
+            </a:lvl1pPr>
+            <a:lvl2pPr algn="l" rtl="0" eaLnBrk="1" fontAlgn="base" hangingPunct="1">
+              <a:spcBef>
+                <a:spcPct val="0"/>
+              </a:spcBef>
+              <a:spcAft>
+                <a:spcPct val="0"/>
+              </a:spcAft>
+              <a:defRPr sz="4400">
+                <a:solidFill>
+                  <a:schemeClr val="bg1"/>
+                </a:solidFill>
+                <a:latin typeface="Microsoft Sans Serif" panose="020B0604020202020204" pitchFamily="34" charset="0"/>
+              </a:defRPr>
+            </a:lvl2pPr>
+            <a:lvl3pPr algn="l" rtl="0" eaLnBrk="1" fontAlgn="base" hangingPunct="1">
+              <a:spcBef>
+                <a:spcPct val="0"/>
+              </a:spcBef>
+              <a:spcAft>
+                <a:spcPct val="0"/>
+              </a:spcAft>
+              <a:defRPr sz="4400">
+                <a:solidFill>
+                  <a:schemeClr val="bg1"/>
+                </a:solidFill>
+                <a:latin typeface="Microsoft Sans Serif" panose="020B0604020202020204" pitchFamily="34" charset="0"/>
+              </a:defRPr>
+            </a:lvl3pPr>
+            <a:lvl4pPr algn="l" rtl="0" eaLnBrk="1" fontAlgn="base" hangingPunct="1">
+              <a:spcBef>
+                <a:spcPct val="0"/>
+              </a:spcBef>
+              <a:spcAft>
+                <a:spcPct val="0"/>
+              </a:spcAft>
+              <a:defRPr sz="4400">
+                <a:solidFill>
+                  <a:schemeClr val="bg1"/>
+                </a:solidFill>
+                <a:latin typeface="Microsoft Sans Serif" panose="020B0604020202020204" pitchFamily="34" charset="0"/>
+              </a:defRPr>
+            </a:lvl4pPr>
+            <a:lvl5pPr algn="l" rtl="0" eaLnBrk="1" fontAlgn="base" hangingPunct="1">
+              <a:spcBef>
+                <a:spcPct val="0"/>
+              </a:spcBef>
+              <a:spcAft>
+                <a:spcPct val="0"/>
+              </a:spcAft>
+              <a:defRPr sz="4400">
+                <a:solidFill>
+                  <a:schemeClr val="bg1"/>
+                </a:solidFill>
+                <a:latin typeface="Microsoft Sans Serif" panose="020B0604020202020204" pitchFamily="34" charset="0"/>
+              </a:defRPr>
+            </a:lvl5pPr>
+            <a:lvl6pPr marL="457200" algn="l" rtl="0" eaLnBrk="1" fontAlgn="base" hangingPunct="1">
+              <a:spcBef>
+                <a:spcPct val="0"/>
+              </a:spcBef>
+              <a:spcAft>
+                <a:spcPct val="0"/>
+              </a:spcAft>
+              <a:defRPr sz="4400">
+                <a:solidFill>
+                  <a:schemeClr val="bg1"/>
+                </a:solidFill>
+                <a:latin typeface="Microsoft Sans Serif" panose="020B0604020202020204" pitchFamily="34" charset="0"/>
+              </a:defRPr>
+            </a:lvl6pPr>
+            <a:lvl7pPr marL="914400" algn="l" rtl="0" eaLnBrk="1" fontAlgn="base" hangingPunct="1">
+              <a:spcBef>
+                <a:spcPct val="0"/>
+              </a:spcBef>
+              <a:spcAft>
+                <a:spcPct val="0"/>
+              </a:spcAft>
+              <a:defRPr sz="4400">
+                <a:solidFill>
+                  <a:schemeClr val="bg1"/>
+                </a:solidFill>
+                <a:latin typeface="Microsoft Sans Serif" panose="020B0604020202020204" pitchFamily="34" charset="0"/>
+              </a:defRPr>
+            </a:lvl7pPr>
+            <a:lvl8pPr marL="1371600" algn="l" rtl="0" eaLnBrk="1" fontAlgn="base" hangingPunct="1">
+              <a:spcBef>
+                <a:spcPct val="0"/>
+              </a:spcBef>
+              <a:spcAft>
+                <a:spcPct val="0"/>
+              </a:spcAft>
+              <a:defRPr sz="4400">
+                <a:solidFill>
+                  <a:schemeClr val="bg1"/>
+                </a:solidFill>
+                <a:latin typeface="Microsoft Sans Serif" panose="020B0604020202020204" pitchFamily="34" charset="0"/>
+              </a:defRPr>
+            </a:lvl8pPr>
+            <a:lvl9pPr marL="1828800" algn="l" rtl="0" eaLnBrk="1" fontAlgn="base" hangingPunct="1">
+              <a:spcBef>
+                <a:spcPct val="0"/>
+              </a:spcBef>
+              <a:spcAft>
+                <a:spcPct val="0"/>
+              </a:spcAft>
+              <a:defRPr sz="4400">
+                <a:solidFill>
+                  <a:schemeClr val="bg1"/>
+                </a:solidFill>
+                <a:latin typeface="Microsoft Sans Serif" panose="020B0604020202020204" pitchFamily="34" charset="0"/>
+              </a:defRPr>
+            </a:lvl9pPr>
+          </a:lstStyle>
+          <a:p>
+            <a:r>
+              <a:rPr lang="pt-BR">
+                <a:solidFill>
+                  <a:srgbClr val="C00000"/>
+                </a:solidFill>
+              </a:rPr>
+              <a:t>INTERFACE GRÁFICA</a:t>
+            </a:r>
+            <a:endParaRPr lang="pt-BR" dirty="0">
+              <a:solidFill>
+                <a:srgbClr val="C00000"/>
+              </a:solidFill>
+            </a:endParaRPr>
+          </a:p>
+        </p:txBody>
+      </p:sp>
+      <p:sp>
+        <p:nvSpPr>
+          <p:cNvPr id="8" name="Title 1">
+            <a:extLst>
+              <a:ext uri="{FF2B5EF4-FFF2-40B4-BE49-F238E27FC236}">
+                <a16:creationId xmlns:a16="http://schemas.microsoft.com/office/drawing/2014/main" id="{FCF8AA25-F67C-49E5-ABE9-C6D7F5F50B80}"/>
+              </a:ext>
+            </a:extLst>
+          </p:cNvPr>
+          <p:cNvSpPr txBox="1">
+            <a:spLocks/>
+          </p:cNvSpPr>
+          <p:nvPr/>
+        </p:nvSpPr>
+        <p:spPr bwMode="auto">
+          <a:xfrm>
+            <a:off x="1115616" y="3212976"/>
+            <a:ext cx="7315200" cy="715963"/>
+          </a:xfrm>
+          <a:prstGeom prst="rect">
+            <a:avLst/>
+          </a:prstGeom>
+          <a:noFill/>
+          <a:ln>
+            <a:noFill/>
+          </a:ln>
+          <a:effectLst/>
+          <a:extLst>
+            <a:ext uri="{909E8E84-426E-40DD-AFC4-6F175D3DCCD1}">
+              <a14:hiddenFill xmlns:a14="http://schemas.microsoft.com/office/drawing/2010/main">
+                <a:solidFill>
+                  <a:schemeClr val="accent1"/>
+                </a:solidFill>
+              </a14:hiddenFill>
+            </a:ext>
+            <a:ext uri="{91240B29-F687-4F45-9708-019B960494DF}">
+              <a14:hiddenLine xmlns:a14="http://schemas.microsoft.com/office/drawing/2010/main" w="9525">
+                <a:solidFill>
+                  <a:schemeClr val="tx1"/>
+                </a:solidFill>
+                <a:miter lim="800000"/>
+                <a:headEnd/>
+                <a:tailEnd/>
+              </a14:hiddenLine>
+            </a:ext>
+            <a:ext uri="{AF507438-7753-43E0-B8FC-AC1667EBCBE1}">
+              <a14:hiddenEffects xmlns:a14="http://schemas.microsoft.com/office/drawing/2010/main">
+                <a:effectLst>
+                  <a:outerShdw dist="35921" dir="2700000" algn="ctr" rotWithShape="0">
+                    <a:schemeClr val="bg2"/>
+                  </a:outerShdw>
+                </a:effectLst>
+              </a14:hiddenEffects>
+            </a:ext>
+          </a:extLst>
+        </p:spPr>
+        <p:txBody>
+          <a:bodyPr vert="horz" wrap="square" lIns="91440" tIns="45720" rIns="91440" bIns="45720" numCol="1" anchor="ctr" anchorCtr="0" compatLnSpc="1">
+            <a:prstTxWarp prst="textNoShape">
+              <a:avLst/>
+            </a:prstTxWarp>
+          </a:bodyPr>
+          <a:lstStyle>
+            <a:lvl1pPr algn="l" rtl="0" eaLnBrk="1" fontAlgn="base" hangingPunct="1">
+              <a:spcBef>
+                <a:spcPct val="0"/>
+              </a:spcBef>
+              <a:spcAft>
+                <a:spcPct val="0"/>
+              </a:spcAft>
+              <a:defRPr sz="4400" kern="1200">
+                <a:solidFill>
+                  <a:schemeClr val="bg1"/>
+                </a:solidFill>
+                <a:latin typeface="+mj-lt"/>
+                <a:ea typeface="+mj-ea"/>
+                <a:cs typeface="+mj-cs"/>
+              </a:defRPr>
+            </a:lvl1pPr>
+            <a:lvl2pPr algn="l" rtl="0" eaLnBrk="1" fontAlgn="base" hangingPunct="1">
+              <a:spcBef>
+                <a:spcPct val="0"/>
+              </a:spcBef>
+              <a:spcAft>
+                <a:spcPct val="0"/>
+              </a:spcAft>
+              <a:defRPr sz="4400">
+                <a:solidFill>
+                  <a:schemeClr val="bg1"/>
+                </a:solidFill>
+                <a:latin typeface="Microsoft Sans Serif" panose="020B0604020202020204" pitchFamily="34" charset="0"/>
+              </a:defRPr>
+            </a:lvl2pPr>
+            <a:lvl3pPr algn="l" rtl="0" eaLnBrk="1" fontAlgn="base" hangingPunct="1">
+              <a:spcBef>
+                <a:spcPct val="0"/>
+              </a:spcBef>
+              <a:spcAft>
+                <a:spcPct val="0"/>
+              </a:spcAft>
+              <a:defRPr sz="4400">
+                <a:solidFill>
+                  <a:schemeClr val="bg1"/>
+                </a:solidFill>
+                <a:latin typeface="Microsoft Sans Serif" panose="020B0604020202020204" pitchFamily="34" charset="0"/>
+              </a:defRPr>
+            </a:lvl3pPr>
+            <a:lvl4pPr algn="l" rtl="0" eaLnBrk="1" fontAlgn="base" hangingPunct="1">
+              <a:spcBef>
+                <a:spcPct val="0"/>
+              </a:spcBef>
+              <a:spcAft>
+                <a:spcPct val="0"/>
+              </a:spcAft>
+              <a:defRPr sz="4400">
+                <a:solidFill>
+                  <a:schemeClr val="bg1"/>
+                </a:solidFill>
+                <a:latin typeface="Microsoft Sans Serif" panose="020B0604020202020204" pitchFamily="34" charset="0"/>
+              </a:defRPr>
+            </a:lvl4pPr>
+            <a:lvl5pPr algn="l" rtl="0" eaLnBrk="1" fontAlgn="base" hangingPunct="1">
+              <a:spcBef>
+                <a:spcPct val="0"/>
+              </a:spcBef>
+              <a:spcAft>
+                <a:spcPct val="0"/>
+              </a:spcAft>
+              <a:defRPr sz="4400">
+                <a:solidFill>
+                  <a:schemeClr val="bg1"/>
+                </a:solidFill>
+                <a:latin typeface="Microsoft Sans Serif" panose="020B0604020202020204" pitchFamily="34" charset="0"/>
+              </a:defRPr>
+            </a:lvl5pPr>
+            <a:lvl6pPr marL="457200" algn="l" rtl="0" eaLnBrk="1" fontAlgn="base" hangingPunct="1">
+              <a:spcBef>
+                <a:spcPct val="0"/>
+              </a:spcBef>
+              <a:spcAft>
+                <a:spcPct val="0"/>
+              </a:spcAft>
+              <a:defRPr sz="4400">
+                <a:solidFill>
+                  <a:schemeClr val="bg1"/>
+                </a:solidFill>
+                <a:latin typeface="Microsoft Sans Serif" panose="020B0604020202020204" pitchFamily="34" charset="0"/>
+              </a:defRPr>
+            </a:lvl6pPr>
+            <a:lvl7pPr marL="914400" algn="l" rtl="0" eaLnBrk="1" fontAlgn="base" hangingPunct="1">
+              <a:spcBef>
+                <a:spcPct val="0"/>
+              </a:spcBef>
+              <a:spcAft>
+                <a:spcPct val="0"/>
+              </a:spcAft>
+              <a:defRPr sz="4400">
+                <a:solidFill>
+                  <a:schemeClr val="bg1"/>
+                </a:solidFill>
+                <a:latin typeface="Microsoft Sans Serif" panose="020B0604020202020204" pitchFamily="34" charset="0"/>
+              </a:defRPr>
+            </a:lvl7pPr>
+            <a:lvl8pPr marL="1371600" algn="l" rtl="0" eaLnBrk="1" fontAlgn="base" hangingPunct="1">
+              <a:spcBef>
+                <a:spcPct val="0"/>
+              </a:spcBef>
+              <a:spcAft>
+                <a:spcPct val="0"/>
+              </a:spcAft>
+              <a:defRPr sz="4400">
+                <a:solidFill>
+                  <a:schemeClr val="bg1"/>
+                </a:solidFill>
+                <a:latin typeface="Microsoft Sans Serif" panose="020B0604020202020204" pitchFamily="34" charset="0"/>
+              </a:defRPr>
+            </a:lvl8pPr>
+            <a:lvl9pPr marL="1828800" algn="l" rtl="0" eaLnBrk="1" fontAlgn="base" hangingPunct="1">
+              <a:spcBef>
+                <a:spcPct val="0"/>
+              </a:spcBef>
+              <a:spcAft>
+                <a:spcPct val="0"/>
+              </a:spcAft>
+              <a:defRPr sz="4400">
+                <a:solidFill>
+                  <a:schemeClr val="bg1"/>
+                </a:solidFill>
+                <a:latin typeface="Microsoft Sans Serif" panose="020B0604020202020204" pitchFamily="34" charset="0"/>
+              </a:defRPr>
+            </a:lvl9pPr>
+          </a:lstStyle>
+          <a:p>
+            <a:r>
+              <a:rPr lang="pt-BR" dirty="0"/>
+              <a:t>INTERFACE GRÁFICA</a:t>
+            </a:r>
+          </a:p>
+        </p:txBody>
+      </p:sp>
+    </p:spTree>
+    <p:extLst>
+      <p:ext uri="{BB962C8B-B14F-4D97-AF65-F5344CB8AC3E}">
+        <p14:creationId xmlns:p14="http://schemas.microsoft.com/office/powerpoint/2010/main" val="1510004653"/>
       </p:ext>
     </p:extLst>
   </p:cSld>

</xml_diff>